<commit_message>
Deployed fd238e9 with MkDocs version: 1.1.2
</commit_message>
<xml_diff>
--- a/aulas/01-introducao/slides.pptx
+++ b/aulas/01-introducao/slides.pptx
@@ -28860,7 +28860,7 @@
         <p:spPr bwMode="auto">
           <a:xfrm flipH="0" flipV="0">
             <a:off x="309228" y="1661757"/>
-            <a:ext cx="8704382" cy="4976430"/>
+            <a:ext cx="8704382" cy="4976429"/>
           </a:xfrm>
           <a:prstGeom prst="rect">
             <a:avLst/>
@@ -28879,8 +28879,23 @@
             <a:pPr>
               <a:defRPr/>
             </a:pPr>
+            <a:endParaRPr lang="en-US" sz="2400" b="0" i="0" u="none" strike="noStrike" cap="none" spc="0">
+              <a:solidFill>
+                <a:srgbClr val="000000"/>
+              </a:solidFill>
+              <a:latin typeface="Arial"/>
+              <a:ea typeface="Arial"/>
+              <a:cs typeface="Arial"/>
+            </a:endParaRPr>
+          </a:p>
+          <a:p>
+            <a:pPr marL="349965" indent="-349965">
+              <a:buFont typeface="Arial"/>
+              <a:buChar char="•"/>
+              <a:defRPr/>
+            </a:pPr>
             <a:r>
-              <a:rPr lang="en-US" sz="2400" b="1" i="0" u="sng" strike="noStrike" cap="none" spc="0">
+              <a:rPr lang="en-US" sz="2400" b="0" i="0" u="none" strike="noStrike" cap="none" spc="0">
                 <a:solidFill>
                   <a:srgbClr val="000000"/>
                 </a:solidFill>
@@ -28888,7 +28903,7 @@
                 <a:ea typeface="Arial"/>
                 <a:cs typeface="Arial"/>
               </a:rPr>
-              <a:t>T1 (remota):</a:t>
+              <a:t>Divisão de turmas será manual</a:t>
             </a:r>
             <a:endParaRPr lang="en-US" sz="2400" b="0" i="0" u="none" strike="noStrike" cap="none" spc="0">
               <a:solidFill>
@@ -28905,6 +28920,21 @@
               <a:buChar char="•"/>
               <a:defRPr/>
             </a:pPr>
+            <a:endParaRPr lang="en-US" sz="2400" b="0" i="0" u="none" strike="noStrike" cap="none" spc="0">
+              <a:solidFill>
+                <a:srgbClr val="000000"/>
+              </a:solidFill>
+              <a:latin typeface="Arial"/>
+              <a:ea typeface="Arial"/>
+              <a:cs typeface="Arial"/>
+            </a:endParaRPr>
+          </a:p>
+          <a:p>
+            <a:pPr marL="349965" indent="-349965">
+              <a:buFont typeface="Arial"/>
+              <a:buChar char="•"/>
+              <a:defRPr/>
+            </a:pPr>
             <a:r>
               <a:rPr lang="en-US" sz="2400" b="0" i="0" u="none" strike="noStrike" cap="none" spc="0">
                 <a:solidFill>
@@ -28914,7 +28944,7 @@
                 <a:ea typeface="Arial"/>
                 <a:cs typeface="Arial"/>
               </a:rPr>
-              <a:t>SuperComputação TER 09:45 SEX 07:30</a:t>
+              <a:t>Faremos conforme as preferências desta pesquisa</a:t>
             </a:r>
             <a:endParaRPr lang="en-US" sz="2400" b="0" i="0" u="none" strike="noStrike" cap="none" spc="0">
               <a:solidFill>
@@ -28931,6 +28961,21 @@
               <a:buChar char="•"/>
               <a:defRPr/>
             </a:pPr>
+            <a:endParaRPr lang="en-US" sz="2400" b="0" i="0" u="none" strike="noStrike" cap="none" spc="0">
+              <a:solidFill>
+                <a:srgbClr val="000000"/>
+              </a:solidFill>
+              <a:latin typeface="Arial"/>
+              <a:ea typeface="Arial"/>
+              <a:cs typeface="Arial"/>
+            </a:endParaRPr>
+          </a:p>
+          <a:p>
+            <a:pPr marL="349965" indent="-349965">
+              <a:buFont typeface="Arial"/>
+              <a:buChar char="•"/>
+              <a:defRPr/>
+            </a:pPr>
             <a:r>
               <a:rPr lang="en-US" sz="2400" b="0" i="0" u="none" strike="noStrike" cap="none" spc="0">
                 <a:solidFill>
@@ -28940,96 +28985,7 @@
                 <a:ea typeface="Arial"/>
                 <a:cs typeface="Arial"/>
               </a:rPr>
-              <a:t>Jogos Digitais QUA 13:30 SEX 13:30</a:t>
-            </a:r>
-            <a:endParaRPr lang="en-US" sz="2400" b="0" i="0" u="none" strike="noStrike" cap="none" spc="0">
-              <a:solidFill>
-                <a:srgbClr val="000000"/>
-              </a:solidFill>
-              <a:latin typeface="Arial"/>
-              <a:ea typeface="Arial"/>
-              <a:cs typeface="Arial"/>
-            </a:endParaRPr>
-          </a:p>
-          <a:p>
-            <a:pPr>
-              <a:defRPr/>
-            </a:pPr>
-            <a:endParaRPr lang="en-US" sz="2400" b="0" i="0" u="none" strike="noStrike" cap="none" spc="0">
-              <a:solidFill>
-                <a:srgbClr val="000000"/>
-              </a:solidFill>
-              <a:latin typeface="Arial"/>
-              <a:ea typeface="Arial"/>
-              <a:cs typeface="Arial"/>
-            </a:endParaRPr>
-          </a:p>
-          <a:p>
-            <a:pPr>
-              <a:defRPr/>
-            </a:pPr>
-            <a:r>
-              <a:rPr lang="en-US" sz="2400" b="1" i="0" u="sng" strike="noStrike" cap="none" spc="0">
-                <a:solidFill>
-                  <a:srgbClr val="000000"/>
-                </a:solidFill>
-                <a:latin typeface="Arial"/>
-                <a:ea typeface="Arial"/>
-                <a:cs typeface="Arial"/>
-              </a:rPr>
-              <a:t>T2 (presencial): </a:t>
-            </a:r>
-            <a:endParaRPr sz="2400" b="0" i="0" u="sng" strike="noStrike" cap="none" spc="0">
-              <a:solidFill>
-                <a:srgbClr val="000000"/>
-              </a:solidFill>
-              <a:latin typeface="Arial"/>
-              <a:ea typeface="Arial"/>
-              <a:cs typeface="Arial"/>
-            </a:endParaRPr>
-          </a:p>
-          <a:p>
-            <a:pPr marL="349965" indent="-349965">
-              <a:buFont typeface="Arial"/>
-              <a:buChar char="•"/>
-              <a:defRPr/>
-            </a:pPr>
-            <a:r>
-              <a:rPr lang="en-US" sz="2400" b="0" i="0" u="none" strike="noStrike" cap="none" spc="0">
-                <a:solidFill>
-                  <a:srgbClr val="000000"/>
-                </a:solidFill>
-                <a:latin typeface="Arial"/>
-                <a:ea typeface="Arial"/>
-                <a:cs typeface="Arial"/>
-              </a:rPr>
-              <a:t>SuperComputação QUA 13:30 SEX 13:30</a:t>
-            </a:r>
-            <a:endParaRPr lang="en-US" sz="2400" b="0" i="0" u="none" strike="noStrike" cap="none" spc="0">
-              <a:solidFill>
-                <a:srgbClr val="000000"/>
-              </a:solidFill>
-              <a:latin typeface="Arial"/>
-              <a:ea typeface="Arial"/>
-              <a:cs typeface="Arial"/>
-            </a:endParaRPr>
-          </a:p>
-          <a:p>
-            <a:pPr marL="750014" lvl="1" indent="-349965">
-              <a:buFont typeface="Arial"/>
-              <a:buChar char="•"/>
-              <a:defRPr/>
-            </a:pPr>
-            <a:r>
-              <a:rPr lang="en-US" sz="2400" b="0" i="0" u="none" strike="noStrike" cap="none" spc="0">
-                <a:solidFill>
-                  <a:srgbClr val="000000"/>
-                </a:solidFill>
-                <a:latin typeface="Arial"/>
-                <a:ea typeface="Arial"/>
-                <a:cs typeface="Arial"/>
-              </a:rPr>
-              <a:t>Jogos Digitais TER 09:45 SEX 07:30</a:t>
+              <a:t>Acertaremos casos particulares com o tempo</a:t>
             </a:r>
             <a:endParaRPr lang="en-US" sz="2400" b="0" i="0" u="none" strike="noStrike" cap="none" spc="0">
               <a:solidFill>
@@ -29267,7 +29223,7 @@
         <p:spPr bwMode="auto">
           <a:xfrm flipH="0" flipV="0">
             <a:off x="309228" y="1661757"/>
-            <a:ext cx="8704382" cy="4976430"/>
+            <a:ext cx="8704382" cy="4976429"/>
           </a:xfrm>
           <a:prstGeom prst="rect">
             <a:avLst/>

</xml_diff>